<commit_message>
Expanded lecture 6 to cover Stanford heart transplant data.
</commit_message>
<xml_diff>
--- a/bin/survival lecture 5.pptx
+++ b/bin/survival lecture 5.pptx
@@ -356,7 +356,7 @@
               <a:pPr>
                 <a:defRPr/>
               </a:pPr>
-              <a:t>5/27/2018</a:t>
+              <a:t>6/1/2018</a:t>
             </a:fld>
             <a:endParaRPr lang="en-US" altLang="en-US"/>
           </a:p>
@@ -664,7 +664,7 @@
               <a:pPr>
                 <a:defRPr/>
               </a:pPr>
-              <a:t>5/27/2018</a:t>
+              <a:t>6/1/2018</a:t>
             </a:fld>
             <a:endParaRPr lang="en-US" altLang="en-US"/>
           </a:p>
@@ -5709,9 +5709,10 @@
           <a:lstStyle/>
           <a:p>
             <a:r>
-              <a:rPr lang="en-US" dirty="0"/>
-              <a:t>Lecture 6.</a:t>
-            </a:r>
+              <a:rPr lang="en-US"/>
+              <a:t>Lecture 5.</a:t>
+            </a:r>
+            <a:endParaRPr lang="en-US" dirty="0"/>
           </a:p>
         </p:txBody>
       </p:sp>

</xml_diff>